<commit_message>
agregue un diagrama a las diapositivas
</commit_message>
<xml_diff>
--- a/Clase/Exposiciones/MoProSoft.pptx
+++ b/Clase/Exposiciones/MoProSoft.pptx
@@ -13,11 +13,13 @@
     <p:sldId id="261" r:id="rId7"/>
     <p:sldId id="262" r:id="rId8"/>
     <p:sldId id="263" r:id="rId9"/>
-    <p:sldId id="264" r:id="rId10"/>
-    <p:sldId id="265" r:id="rId11"/>
-    <p:sldId id="266" r:id="rId12"/>
-    <p:sldId id="267" r:id="rId13"/>
-    <p:sldId id="268" r:id="rId14"/>
+    <p:sldId id="269" r:id="rId10"/>
+    <p:sldId id="264" r:id="rId11"/>
+    <p:sldId id="265" r:id="rId12"/>
+    <p:sldId id="266" r:id="rId13"/>
+    <p:sldId id="270" r:id="rId14"/>
+    <p:sldId id="267" r:id="rId15"/>
+    <p:sldId id="268" r:id="rId16"/>
   </p:sldIdLst>
   <p:sldSz cx="12192000" cy="6858000"/>
   <p:notesSz cx="6858000" cy="9144000"/>
@@ -116,6 +118,11 @@
       </a:defRPr>
     </a:lvl9pPr>
   </p:defaultTextStyle>
+  <p:extLst>
+    <p:ext uri="{EFAFB233-063F-42B5-8137-9DF3F51BA10A}">
+      <p15:sldGuideLst xmlns:p15="http://schemas.microsoft.com/office/powerpoint/2012/main"/>
+    </p:ext>
+  </p:extLst>
 </p:presentation>
 </file>
 
@@ -809,7 +816,7 @@
             <a:fld id="{D200B3F0-A9BC-48CE-8EB6-ECE965069900}" type="datetimeFigureOut">
               <a:rPr lang="en-US" dirty="0"/>
               <a:pPr/>
-              <a:t>5/11/2015</a:t>
+              <a:t>5/12/2015</a:t>
             </a:fld>
             <a:endParaRPr lang="en-US" dirty="0"/>
           </a:p>
@@ -1970,7 +1977,7 @@
           <a:p>
             <a:fld id="{3DF9FFFF-3106-4DDB-AA62-0C80862170D6}" type="datetimeFigureOut">
               <a:rPr lang="en-US" dirty="0"/>
-              <a:t>5/11/2015</a:t>
+              <a:t>5/12/2015</a:t>
             </a:fld>
             <a:endParaRPr lang="en-US" dirty="0"/>
           </a:p>
@@ -3024,7 +3031,7 @@
           <a:p>
             <a:fld id="{A3DA38B7-AE95-4DC8-9A51-7A71F545B098}" type="datetimeFigureOut">
               <a:rPr lang="en-US" dirty="0"/>
-              <a:t>5/11/2015</a:t>
+              <a:t>5/12/2015</a:t>
             </a:fld>
             <a:endParaRPr lang="en-US" dirty="0"/>
           </a:p>
@@ -4237,7 +4244,7 @@
           <a:p>
             <a:fld id="{86F1EC2B-8188-4AC2-9F0D-8D09C51D505A}" type="datetimeFigureOut">
               <a:rPr lang="en-US" dirty="0"/>
-              <a:t>5/11/2015</a:t>
+              <a:t>5/12/2015</a:t>
             </a:fld>
             <a:endParaRPr lang="en-US" dirty="0"/>
           </a:p>
@@ -5341,7 +5348,7 @@
           <a:p>
             <a:fld id="{9212B75E-944F-430B-BE5F-C69FA8823C04}" type="datetimeFigureOut">
               <a:rPr lang="en-US" dirty="0"/>
-              <a:t>5/11/2015</a:t>
+              <a:t>5/12/2015</a:t>
             </a:fld>
             <a:endParaRPr lang="en-US" dirty="0"/>
           </a:p>
@@ -5993,7 +6000,7 @@
           <a:p>
             <a:fld id="{79AE0DC7-7F53-471C-A711-B3DA6F2535F3}" type="datetimeFigureOut">
               <a:rPr lang="en-US" dirty="0"/>
-              <a:t>5/11/2015</a:t>
+              <a:t>5/12/2015</a:t>
             </a:fld>
             <a:endParaRPr lang="en-US" dirty="0"/>
           </a:p>
@@ -6840,7 +6847,7 @@
           <a:p>
             <a:fld id="{3C1F4C9D-4618-451D-80C1-6A376BB42AB4}" type="datetimeFigureOut">
               <a:rPr lang="en-US" dirty="0"/>
-              <a:t>5/11/2015</a:t>
+              <a:t>5/12/2015</a:t>
             </a:fld>
             <a:endParaRPr lang="en-US" dirty="0"/>
           </a:p>
@@ -7025,7 +7032,7 @@
           <a:p>
             <a:fld id="{F54D2318-CE40-42F6-962A-4C6D6CF697DB}" type="datetimeFigureOut">
               <a:rPr lang="en-US" dirty="0"/>
-              <a:t>5/11/2015</a:t>
+              <a:t>5/12/2015</a:t>
             </a:fld>
             <a:endParaRPr lang="en-US" dirty="0"/>
           </a:p>
@@ -8066,7 +8073,7 @@
           <a:p>
             <a:fld id="{0C476AC1-EB7F-4BEF-90D9-5764B50DAF8A}" type="datetimeFigureOut">
               <a:rPr lang="en-US" dirty="0"/>
-              <a:t>5/11/2015</a:t>
+              <a:t>5/12/2015</a:t>
             </a:fld>
             <a:endParaRPr lang="en-US" dirty="0"/>
           </a:p>
@@ -8282,7 +8289,7 @@
           <a:p>
             <a:fld id="{1B20712A-F861-4AB0-A754-4F5A2033CD4B}" type="datetimeFigureOut">
               <a:rPr lang="en-US" dirty="0"/>
-              <a:t>5/11/2015</a:t>
+              <a:t>5/12/2015</a:t>
             </a:fld>
             <a:endParaRPr lang="en-US" dirty="0"/>
           </a:p>
@@ -9387,7 +9394,7 @@
           <a:p>
             <a:fld id="{324507B7-F2DC-4B2C-B14D-58A9766807A2}" type="datetimeFigureOut">
               <a:rPr lang="en-US" dirty="0"/>
-              <a:t>5/11/2015</a:t>
+              <a:t>5/12/2015</a:t>
             </a:fld>
             <a:endParaRPr lang="en-US" dirty="0"/>
           </a:p>
@@ -9659,7 +9666,7 @@
           <a:p>
             <a:fld id="{904A483D-5CB4-4842-8F2F-05D5276ACF63}" type="datetimeFigureOut">
               <a:rPr lang="en-US" dirty="0"/>
-              <a:t>5/11/2015</a:t>
+              <a:t>5/12/2015</a:t>
             </a:fld>
             <a:endParaRPr lang="en-US" dirty="0"/>
           </a:p>
@@ -10041,7 +10048,7 @@
           <a:p>
             <a:fld id="{1D1CE32E-9DC0-47C8-A657-48F5C3E4A10B}" type="datetimeFigureOut">
               <a:rPr lang="en-US" dirty="0"/>
-              <a:t>5/11/2015</a:t>
+              <a:t>5/12/2015</a:t>
             </a:fld>
             <a:endParaRPr lang="en-US" dirty="0"/>
           </a:p>
@@ -10159,7 +10166,7 @@
           <a:p>
             <a:fld id="{2BDF5C0D-8C3A-4771-A43D-83937FC700D4}" type="datetimeFigureOut">
               <a:rPr lang="en-US" dirty="0"/>
-              <a:t>5/11/2015</a:t>
+              <a:t>5/12/2015</a:t>
             </a:fld>
             <a:endParaRPr lang="en-US" dirty="0"/>
           </a:p>
@@ -10254,7 +10261,7 @@
           <a:p>
             <a:fld id="{0203D2D6-FCC2-425A-A4A7-8058E8C01CB1}" type="datetimeFigureOut">
               <a:rPr lang="en-US" dirty="0"/>
-              <a:t>5/11/2015</a:t>
+              <a:t>5/12/2015</a:t>
             </a:fld>
             <a:endParaRPr lang="en-US" dirty="0"/>
           </a:p>
@@ -11406,7 +11413,7 @@
           <a:p>
             <a:fld id="{D8CF2683-E6E7-4CC3-9EEE-7854DD4F3545}" type="datetimeFigureOut">
               <a:rPr lang="en-US" dirty="0"/>
-              <a:t>5/11/2015</a:t>
+              <a:t>5/12/2015</a:t>
             </a:fld>
             <a:endParaRPr lang="en-US" dirty="0"/>
           </a:p>
@@ -12582,7 +12589,7 @@
           <a:p>
             <a:fld id="{7E120F81-B39D-4CBB-8BF3-5D6E395D0F72}" type="datetimeFigureOut">
               <a:rPr lang="en-US" dirty="0"/>
-              <a:t>5/11/2015</a:t>
+              <a:t>5/12/2015</a:t>
             </a:fld>
             <a:endParaRPr lang="en-US" dirty="0"/>
           </a:p>
@@ -13692,7 +13699,7 @@
           <a:p>
             <a:fld id="{564B320A-89BA-47B2-A525-92E8D10B06E4}" type="datetimeFigureOut">
               <a:rPr lang="en-US" dirty="0"/>
-              <a:t>5/11/2015</a:t>
+              <a:t>5/12/2015</a:t>
             </a:fld>
             <a:endParaRPr lang="en-US" dirty="0"/>
           </a:p>
@@ -14268,7 +14275,6 @@
               <a:rPr lang="es-MX" dirty="0"/>
               <a:t>, y coautores, Modelo de Procesos para la Industria de Software MoProSoft, versión 1.3 (agosto 2005)</a:t>
             </a:r>
-            <a:endParaRPr lang="es-MX" dirty="0"/>
           </a:p>
         </p:txBody>
       </p:sp>
@@ -14282,10 +14288,102 @@
   <p:clrMapOvr>
     <a:masterClrMapping/>
   </p:clrMapOvr>
+  <p:timing>
+    <p:tnLst>
+      <p:par>
+        <p:cTn id="1" dur="indefinite" restart="never" nodeType="tmRoot"/>
+      </p:par>
+    </p:tnLst>
+  </p:timing>
 </p:sld>
 </file>
 
 <file path=ppt/slides/slide10.xml><?xml version="1.0" encoding="utf-8"?>
+<p:sld xmlns:a="http://schemas.openxmlformats.org/drawingml/2006/main" xmlns:r="http://schemas.openxmlformats.org/officeDocument/2006/relationships" xmlns:p="http://schemas.openxmlformats.org/presentationml/2006/main">
+  <p:cSld>
+    <p:spTree>
+      <p:nvGrpSpPr>
+        <p:cNvPr id="1" name=""/>
+        <p:cNvGrpSpPr/>
+        <p:nvPr/>
+      </p:nvGrpSpPr>
+      <p:grpSpPr>
+        <a:xfrm>
+          <a:off x="0" y="0"/>
+          <a:ext cx="0" cy="0"/>
+          <a:chOff x="0" y="0"/>
+          <a:chExt cx="0" cy="0"/>
+        </a:xfrm>
+      </p:grpSpPr>
+      <p:sp>
+        <p:nvSpPr>
+          <p:cNvPr id="2" name="Título 1"/>
+          <p:cNvSpPr>
+            <a:spLocks noGrp="1"/>
+          </p:cNvSpPr>
+          <p:nvPr>
+            <p:ph type="title"/>
+          </p:nvPr>
+        </p:nvSpPr>
+        <p:spPr/>
+        <p:txBody>
+          <a:bodyPr/>
+          <a:lstStyle/>
+          <a:p>
+            <a:endParaRPr lang="es-MX"/>
+          </a:p>
+        </p:txBody>
+      </p:sp>
+      <p:pic>
+        <p:nvPicPr>
+          <p:cNvPr id="5" name="Marcador de contenido 4"/>
+          <p:cNvPicPr>
+            <a:picLocks noGrp="1" noChangeAspect="1"/>
+          </p:cNvPicPr>
+          <p:nvPr>
+            <p:ph idx="1"/>
+          </p:nvPr>
+        </p:nvPicPr>
+        <p:blipFill>
+          <a:blip r:embed="rId2">
+            <a:extLst>
+              <a:ext uri="{28A0092B-C50C-407E-A947-70E740481C1C}">
+                <a14:useLocalDpi xmlns:a14="http://schemas.microsoft.com/office/drawing/2010/main" val="0"/>
+              </a:ext>
+            </a:extLst>
+          </a:blip>
+          <a:stretch>
+            <a:fillRect/>
+          </a:stretch>
+        </p:blipFill>
+        <p:spPr>
+          <a:xfrm>
+            <a:off x="3322749" y="2582522"/>
+            <a:ext cx="4224271" cy="3637974"/>
+          </a:xfrm>
+        </p:spPr>
+      </p:pic>
+    </p:spTree>
+    <p:extLst>
+      <p:ext uri="{BB962C8B-B14F-4D97-AF65-F5344CB8AC3E}">
+        <p14:creationId xmlns:p14="http://schemas.microsoft.com/office/powerpoint/2010/main" val="1759862946"/>
+      </p:ext>
+    </p:extLst>
+  </p:cSld>
+  <p:clrMapOvr>
+    <a:masterClrMapping/>
+  </p:clrMapOvr>
+  <p:timing>
+    <p:tnLst>
+      <p:par>
+        <p:cTn id="1" dur="indefinite" restart="never" nodeType="tmRoot"/>
+      </p:par>
+    </p:tnLst>
+  </p:timing>
+</p:sld>
+</file>
+
+<file path=ppt/slides/slide11.xml><?xml version="1.0" encoding="utf-8"?>
 <p:sld xmlns:a="http://schemas.openxmlformats.org/drawingml/2006/main" xmlns:r="http://schemas.openxmlformats.org/officeDocument/2006/relationships" xmlns:p="http://schemas.openxmlformats.org/presentationml/2006/main">
   <p:cSld>
     <p:spTree>
@@ -14845,10 +14943,17 @@
   <p:clrMapOvr>
     <a:masterClrMapping/>
   </p:clrMapOvr>
+  <p:timing>
+    <p:tnLst>
+      <p:par>
+        <p:cTn id="1" dur="indefinite" restart="never" nodeType="tmRoot"/>
+      </p:par>
+    </p:tnLst>
+  </p:timing>
 </p:sld>
 </file>
 
-<file path=ppt/slides/slide11.xml><?xml version="1.0" encoding="utf-8"?>
+<file path=ppt/slides/slide12.xml><?xml version="1.0" encoding="utf-8"?>
 <p:sld xmlns:a="http://schemas.openxmlformats.org/drawingml/2006/main" xmlns:r="http://schemas.openxmlformats.org/officeDocument/2006/relationships" xmlns:p="http://schemas.openxmlformats.org/presentationml/2006/main">
   <p:cSld>
     <p:spTree>
@@ -15243,114 +15348,13 @@
   <p:clrMapOvr>
     <a:masterClrMapping/>
   </p:clrMapOvr>
-</p:sld>
-</file>
-
-<file path=ppt/slides/slide12.xml><?xml version="1.0" encoding="utf-8"?>
-<p:sld xmlns:a="http://schemas.openxmlformats.org/drawingml/2006/main" xmlns:r="http://schemas.openxmlformats.org/officeDocument/2006/relationships" xmlns:p="http://schemas.openxmlformats.org/presentationml/2006/main">
-  <p:cSld>
-    <p:spTree>
-      <p:nvGrpSpPr>
-        <p:cNvPr id="1" name=""/>
-        <p:cNvGrpSpPr/>
-        <p:nvPr/>
-      </p:nvGrpSpPr>
-      <p:grpSpPr>
-        <a:xfrm>
-          <a:off x="0" y="0"/>
-          <a:ext cx="0" cy="0"/>
-          <a:chOff x="0" y="0"/>
-          <a:chExt cx="0" cy="0"/>
-        </a:xfrm>
-      </p:grpSpPr>
-      <p:sp>
-        <p:nvSpPr>
-          <p:cNvPr id="2" name="Título 1"/>
-          <p:cNvSpPr>
-            <a:spLocks noGrp="1"/>
-          </p:cNvSpPr>
-          <p:nvPr>
-            <p:ph type="title"/>
-          </p:nvPr>
-        </p:nvSpPr>
-        <p:spPr/>
-        <p:txBody>
-          <a:bodyPr/>
-          <a:lstStyle/>
-          <a:p>
-            <a:r>
-              <a:rPr lang="es-MX" dirty="0" smtClean="0"/>
-              <a:t>Beneficios </a:t>
-            </a:r>
-            <a:endParaRPr lang="es-MX" dirty="0"/>
-          </a:p>
-        </p:txBody>
-      </p:sp>
-      <p:sp>
-        <p:nvSpPr>
-          <p:cNvPr id="3" name="Marcador de contenido 2"/>
-          <p:cNvSpPr>
-            <a:spLocks noGrp="1"/>
-          </p:cNvSpPr>
-          <p:nvPr>
-            <p:ph idx="1"/>
-          </p:nvPr>
-        </p:nvSpPr>
-        <p:spPr/>
-        <p:txBody>
-          <a:bodyPr>
-            <a:normAutofit/>
-          </a:bodyPr>
-          <a:lstStyle/>
-          <a:p>
-            <a:r>
-              <a:rPr lang="es-MX" dirty="0"/>
-              <a:t>Los beneficios de MoProSoft, en palabras de la directora del equipo que lo elaboró, la Dra. </a:t>
-            </a:r>
-            <a:r>
-              <a:rPr lang="es-MX" dirty="0" err="1"/>
-              <a:t>Hanna</a:t>
-            </a:r>
-            <a:r>
-              <a:rPr lang="es-MX" dirty="0"/>
-              <a:t> </a:t>
-            </a:r>
-            <a:r>
-              <a:rPr lang="es-MX" dirty="0" err="1"/>
-              <a:t>Oktaba</a:t>
-            </a:r>
-            <a:r>
-              <a:rPr lang="es-MX" dirty="0"/>
-              <a:t>, son:</a:t>
-            </a:r>
-          </a:p>
-          <a:p>
-            <a:r>
-              <a:rPr lang="es-MX" dirty="0"/>
-              <a:t>Al tener prácticas integradas, que abarcan desde la gestión de negocio hasta el desarrollo y mantenimiento de software, las empresas logran un mayor control sobre su desempeño en el mercado.</a:t>
-            </a:r>
-          </a:p>
-          <a:p>
-            <a:r>
-              <a:rPr lang="es-MX" dirty="0"/>
-              <a:t>El costo de incorporación del nuevo personal podría disminuir si se enfocan a la educación y a la capacitación sobre un modelo único.</a:t>
-            </a:r>
-          </a:p>
-          <a:p>
-            <a:endParaRPr lang="es-MX" dirty="0"/>
-          </a:p>
-        </p:txBody>
-      </p:sp>
-    </p:spTree>
-    <p:extLst>
-      <p:ext uri="{BB962C8B-B14F-4D97-AF65-F5344CB8AC3E}">
-        <p14:creationId xmlns:p14="http://schemas.microsoft.com/office/powerpoint/2010/main" val="1908669769"/>
-      </p:ext>
-    </p:extLst>
-  </p:cSld>
-  <p:clrMapOvr>
-    <a:masterClrMapping/>
-  </p:clrMapOvr>
+  <p:timing>
+    <p:tnLst>
+      <p:par>
+        <p:cTn id="1" dur="indefinite" restart="never" nodeType="tmRoot"/>
+      </p:par>
+    </p:tnLst>
+  </p:timing>
 </p:sld>
 </file>
 
@@ -15386,6 +15390,200 @@
           <a:bodyPr/>
           <a:lstStyle/>
           <a:p>
+            <a:r>
+              <a:rPr lang="es-MX" dirty="0" smtClean="0"/>
+              <a:t>Relación entre procesos </a:t>
+            </a:r>
+            <a:endParaRPr lang="es-MX" dirty="0"/>
+          </a:p>
+        </p:txBody>
+      </p:sp>
+      <p:pic>
+        <p:nvPicPr>
+          <p:cNvPr id="5" name="Marcador de contenido 4"/>
+          <p:cNvPicPr>
+            <a:picLocks noGrp="1" noChangeAspect="1"/>
+          </p:cNvPicPr>
+          <p:nvPr>
+            <p:ph idx="1"/>
+          </p:nvPr>
+        </p:nvPicPr>
+        <p:blipFill>
+          <a:blip r:embed="rId2"/>
+          <a:stretch>
+            <a:fillRect/>
+          </a:stretch>
+        </p:blipFill>
+        <p:spPr>
+          <a:xfrm>
+            <a:off x="283779" y="2238703"/>
+            <a:ext cx="11225049" cy="4256690"/>
+          </a:xfrm>
+          <a:prstGeom prst="rect">
+            <a:avLst/>
+          </a:prstGeom>
+        </p:spPr>
+      </p:pic>
+    </p:spTree>
+    <p:extLst>
+      <p:ext uri="{BB962C8B-B14F-4D97-AF65-F5344CB8AC3E}">
+        <p14:creationId xmlns:p14="http://schemas.microsoft.com/office/powerpoint/2010/main" val="1755953179"/>
+      </p:ext>
+    </p:extLst>
+  </p:cSld>
+  <p:clrMapOvr>
+    <a:masterClrMapping/>
+  </p:clrMapOvr>
+</p:sld>
+</file>
+
+<file path=ppt/slides/slide14.xml><?xml version="1.0" encoding="utf-8"?>
+<p:sld xmlns:a="http://schemas.openxmlformats.org/drawingml/2006/main" xmlns:r="http://schemas.openxmlformats.org/officeDocument/2006/relationships" xmlns:p="http://schemas.openxmlformats.org/presentationml/2006/main">
+  <p:cSld>
+    <p:spTree>
+      <p:nvGrpSpPr>
+        <p:cNvPr id="1" name=""/>
+        <p:cNvGrpSpPr/>
+        <p:nvPr/>
+      </p:nvGrpSpPr>
+      <p:grpSpPr>
+        <a:xfrm>
+          <a:off x="0" y="0"/>
+          <a:ext cx="0" cy="0"/>
+          <a:chOff x="0" y="0"/>
+          <a:chExt cx="0" cy="0"/>
+        </a:xfrm>
+      </p:grpSpPr>
+      <p:sp>
+        <p:nvSpPr>
+          <p:cNvPr id="2" name="Título 1"/>
+          <p:cNvSpPr>
+            <a:spLocks noGrp="1"/>
+          </p:cNvSpPr>
+          <p:nvPr>
+            <p:ph type="title"/>
+          </p:nvPr>
+        </p:nvSpPr>
+        <p:spPr/>
+        <p:txBody>
+          <a:bodyPr/>
+          <a:lstStyle/>
+          <a:p>
+            <a:r>
+              <a:rPr lang="es-MX" dirty="0" smtClean="0"/>
+              <a:t>Beneficios </a:t>
+            </a:r>
+            <a:endParaRPr lang="es-MX" dirty="0"/>
+          </a:p>
+        </p:txBody>
+      </p:sp>
+      <p:sp>
+        <p:nvSpPr>
+          <p:cNvPr id="3" name="Marcador de contenido 2"/>
+          <p:cNvSpPr>
+            <a:spLocks noGrp="1"/>
+          </p:cNvSpPr>
+          <p:nvPr>
+            <p:ph idx="1"/>
+          </p:nvPr>
+        </p:nvSpPr>
+        <p:spPr/>
+        <p:txBody>
+          <a:bodyPr>
+            <a:normAutofit/>
+          </a:bodyPr>
+          <a:lstStyle/>
+          <a:p>
+            <a:r>
+              <a:rPr lang="es-MX" dirty="0"/>
+              <a:t>Los beneficios de MoProSoft, en palabras de la directora del equipo que lo elaboró, la Dra. </a:t>
+            </a:r>
+            <a:r>
+              <a:rPr lang="es-MX" dirty="0" err="1"/>
+              <a:t>Hanna</a:t>
+            </a:r>
+            <a:r>
+              <a:rPr lang="es-MX" dirty="0"/>
+              <a:t> </a:t>
+            </a:r>
+            <a:r>
+              <a:rPr lang="es-MX" dirty="0" err="1"/>
+              <a:t>Oktaba</a:t>
+            </a:r>
+            <a:r>
+              <a:rPr lang="es-MX" dirty="0"/>
+              <a:t>, son:</a:t>
+            </a:r>
+          </a:p>
+          <a:p>
+            <a:r>
+              <a:rPr lang="es-MX" dirty="0"/>
+              <a:t>Al tener prácticas integradas, que abarcan desde la gestión de negocio hasta el desarrollo y mantenimiento de software, las empresas logran un mayor control sobre su desempeño en el mercado.</a:t>
+            </a:r>
+          </a:p>
+          <a:p>
+            <a:r>
+              <a:rPr lang="es-MX" dirty="0"/>
+              <a:t>El costo de incorporación del nuevo personal podría disminuir si se enfocan a la educación y a la capacitación sobre un modelo único.</a:t>
+            </a:r>
+          </a:p>
+          <a:p>
+            <a:endParaRPr lang="es-MX" dirty="0"/>
+          </a:p>
+        </p:txBody>
+      </p:sp>
+    </p:spTree>
+    <p:extLst>
+      <p:ext uri="{BB962C8B-B14F-4D97-AF65-F5344CB8AC3E}">
+        <p14:creationId xmlns:p14="http://schemas.microsoft.com/office/powerpoint/2010/main" val="1908669769"/>
+      </p:ext>
+    </p:extLst>
+  </p:cSld>
+  <p:clrMapOvr>
+    <a:masterClrMapping/>
+  </p:clrMapOvr>
+  <p:timing>
+    <p:tnLst>
+      <p:par>
+        <p:cTn id="1" dur="indefinite" restart="never" nodeType="tmRoot"/>
+      </p:par>
+    </p:tnLst>
+  </p:timing>
+</p:sld>
+</file>
+
+<file path=ppt/slides/slide15.xml><?xml version="1.0" encoding="utf-8"?>
+<p:sld xmlns:a="http://schemas.openxmlformats.org/drawingml/2006/main" xmlns:r="http://schemas.openxmlformats.org/officeDocument/2006/relationships" xmlns:p="http://schemas.openxmlformats.org/presentationml/2006/main">
+  <p:cSld>
+    <p:spTree>
+      <p:nvGrpSpPr>
+        <p:cNvPr id="1" name=""/>
+        <p:cNvGrpSpPr/>
+        <p:nvPr/>
+      </p:nvGrpSpPr>
+      <p:grpSpPr>
+        <a:xfrm>
+          <a:off x="0" y="0"/>
+          <a:ext cx="0" cy="0"/>
+          <a:chOff x="0" y="0"/>
+          <a:chExt cx="0" cy="0"/>
+        </a:xfrm>
+      </p:grpSpPr>
+      <p:sp>
+        <p:nvSpPr>
+          <p:cNvPr id="2" name="Título 1"/>
+          <p:cNvSpPr>
+            <a:spLocks noGrp="1"/>
+          </p:cNvSpPr>
+          <p:nvPr>
+            <p:ph type="title"/>
+          </p:nvPr>
+        </p:nvSpPr>
+        <p:spPr/>
+        <p:txBody>
+          <a:bodyPr/>
+          <a:lstStyle/>
+          <a:p>
             <a:endParaRPr lang="es-MX"/>
           </a:p>
         </p:txBody>
@@ -15418,12 +15616,12 @@
           </a:p>
           <a:p>
             <a:r>
-              <a:rPr lang="es-MX"/>
+              <a:rPr lang="es-MX" dirty="0"/>
               <a:t>La implantación de MoProSoft no demanda la incorporación de personal especializado en las empresas, únicamente requiere de una adecuada capacitación del personal existente.</a:t>
             </a:r>
           </a:p>
           <a:p>
-            <a:endParaRPr lang="es-MX"/>
+            <a:endParaRPr lang="es-MX" dirty="0"/>
           </a:p>
         </p:txBody>
       </p:sp>
@@ -15437,6 +15635,13 @@
   <p:clrMapOvr>
     <a:masterClrMapping/>
   </p:clrMapOvr>
+  <p:timing>
+    <p:tnLst>
+      <p:par>
+        <p:cTn id="1" dur="indefinite" restart="never" nodeType="tmRoot"/>
+      </p:par>
+    </p:tnLst>
+  </p:timing>
 </p:sld>
 </file>
 
@@ -15575,6 +15780,13 @@
   <p:clrMapOvr>
     <a:masterClrMapping/>
   </p:clrMapOvr>
+  <p:timing>
+    <p:tnLst>
+      <p:par>
+        <p:cTn id="1" dur="indefinite" restart="never" nodeType="tmRoot"/>
+      </p:par>
+    </p:tnLst>
+  </p:timing>
 </p:sld>
 </file>
 
@@ -15707,6 +15919,13 @@
   <p:clrMapOvr>
     <a:masterClrMapping/>
   </p:clrMapOvr>
+  <p:timing>
+    <p:tnLst>
+      <p:par>
+        <p:cTn id="1" dur="indefinite" restart="never" nodeType="tmRoot"/>
+      </p:par>
+    </p:tnLst>
+  </p:timing>
 </p:sld>
 </file>
 
@@ -15835,6 +16054,13 @@
   <p:clrMapOvr>
     <a:masterClrMapping/>
   </p:clrMapOvr>
+  <p:timing>
+    <p:tnLst>
+      <p:par>
+        <p:cTn id="1" dur="indefinite" restart="never" nodeType="tmRoot"/>
+      </p:par>
+    </p:tnLst>
+  </p:timing>
 </p:sld>
 </file>
 
@@ -15927,6 +16153,13 @@
   <p:clrMapOvr>
     <a:masterClrMapping/>
   </p:clrMapOvr>
+  <p:timing>
+    <p:tnLst>
+      <p:par>
+        <p:cTn id="1" dur="indefinite" restart="never" nodeType="tmRoot"/>
+      </p:par>
+    </p:tnLst>
+  </p:timing>
 </p:sld>
 </file>
 
@@ -16019,6 +16252,13 @@
   <p:clrMapOvr>
     <a:masterClrMapping/>
   </p:clrMapOvr>
+  <p:timing>
+    <p:tnLst>
+      <p:par>
+        <p:cTn id="1" dur="indefinite" restart="never" nodeType="tmRoot"/>
+      </p:par>
+    </p:tnLst>
+  </p:timing>
 </p:sld>
 </file>
 
@@ -16117,6 +16357,13 @@
   <p:clrMapOvr>
     <a:masterClrMapping/>
   </p:clrMapOvr>
+  <p:timing>
+    <p:tnLst>
+      <p:par>
+        <p:cTn id="1" dur="indefinite" restart="never" nodeType="tmRoot"/>
+      </p:par>
+    </p:tnLst>
+  </p:timing>
 </p:sld>
 </file>
 
@@ -16179,7 +16426,6 @@
               <a:rPr lang="es-MX" dirty="0"/>
               <a:t>El modelo pretende apoyar a las organizaciones en la estandarización de sus prácticas, en la evaluación de su efectividad y en la integración de la mejora continua. Sintetiza las mejores prácticas en un conjunto pequeño de procesos que abarcan las responsabilidades asociadas a la estructura de una organización que son: la Alta Dirección, Gestión y Operación.</a:t>
             </a:r>
-            <a:endParaRPr lang="es-MX" dirty="0"/>
           </a:p>
         </p:txBody>
       </p:sp>
@@ -16193,6 +16439,13 @@
   <p:clrMapOvr>
     <a:masterClrMapping/>
   </p:clrMapOvr>
+  <p:timing>
+    <p:tnLst>
+      <p:par>
+        <p:cTn id="1" dur="indefinite" restart="never" nodeType="tmRoot"/>
+      </p:par>
+    </p:tnLst>
+  </p:timing>
 </p:sld>
 </file>
 
@@ -16232,45 +16485,171 @@
           </a:p>
         </p:txBody>
       </p:sp>
-      <p:pic>
-        <p:nvPicPr>
-          <p:cNvPr id="5" name="Marcador de contenido 4"/>
-          <p:cNvPicPr>
-            <a:picLocks noGrp="1" noChangeAspect="1"/>
-          </p:cNvPicPr>
+      <p:sp>
+        <p:nvSpPr>
+          <p:cNvPr id="3" name="Marcador de contenido 2"/>
+          <p:cNvSpPr>
+            <a:spLocks noGrp="1"/>
+          </p:cNvSpPr>
           <p:nvPr>
             <p:ph idx="1"/>
           </p:nvPr>
-        </p:nvPicPr>
-        <p:blipFill>
-          <a:blip r:embed="rId2">
-            <a:extLst>
-              <a:ext uri="{28A0092B-C50C-407E-A947-70E740481C1C}">
-                <a14:useLocalDpi xmlns:a14="http://schemas.microsoft.com/office/drawing/2010/main" val="0"/>
-              </a:ext>
-            </a:extLst>
-          </a:blip>
-          <a:stretch>
-            <a:fillRect/>
-          </a:stretch>
-        </p:blipFill>
-        <p:spPr>
-          <a:xfrm>
-            <a:off x="3322749" y="2582522"/>
-            <a:ext cx="4224271" cy="3637974"/>
-          </a:xfrm>
-        </p:spPr>
-      </p:pic>
+        </p:nvSpPr>
+        <p:spPr/>
+        <p:txBody>
+          <a:bodyPr>
+            <a:normAutofit fontScale="85000" lnSpcReduction="10000"/>
+          </a:bodyPr>
+          <a:lstStyle/>
+          <a:p>
+            <a:r>
+              <a:rPr lang="es-MX" dirty="0"/>
+              <a:t>Categoría de Alta Dirección (DIR): Se establecen los lineamientos para los procesos de la Categoría de Gerencia y se retroalimenta con la información generada por ellos en </a:t>
+            </a:r>
+            <a:r>
+              <a:rPr lang="es-MX" dirty="0" smtClean="0"/>
+              <a:t>apoyo a </a:t>
+            </a:r>
+            <a:r>
+              <a:rPr lang="es-MX" dirty="0"/>
+              <a:t>la estrategia de la organización.</a:t>
+            </a:r>
+          </a:p>
+          <a:p>
+            <a:endParaRPr lang="es-MX" dirty="0"/>
+          </a:p>
+          <a:p>
+            <a:r>
+              <a:rPr lang="es-MX" dirty="0"/>
+              <a:t> Categoría de Gerencia (GER): Se </a:t>
+            </a:r>
+            <a:r>
+              <a:rPr lang="es-MX" dirty="0" smtClean="0"/>
+              <a:t>definen </a:t>
+            </a:r>
+            <a:r>
+              <a:rPr lang="es-MX" dirty="0"/>
+              <a:t>los </a:t>
+            </a:r>
+            <a:r>
+              <a:rPr lang="es-MX" dirty="0" smtClean="0"/>
+              <a:t>elementos para el funcionamiento </a:t>
+            </a:r>
+            <a:r>
+              <a:rPr lang="es-MX" dirty="0"/>
+              <a:t>de los procesos de la Categoría de Operación en función de la estrategia de </a:t>
+            </a:r>
+            <a:r>
+              <a:rPr lang="es-MX" dirty="0" smtClean="0"/>
+              <a:t>Dirección, recibe </a:t>
+            </a:r>
+            <a:r>
+              <a:rPr lang="es-MX" dirty="0"/>
+              <a:t>y evalúa la información generada por éstos y comunica	los resultados a	la Categoría de Alta Dirección.</a:t>
+            </a:r>
+          </a:p>
+          <a:p>
+            <a:pPr marL="0" indent="0">
+              <a:buNone/>
+            </a:pPr>
+            <a:r>
+              <a:rPr lang="es-MX" dirty="0"/>
+              <a:t>	</a:t>
+            </a:r>
+          </a:p>
+          <a:p>
+            <a:r>
+              <a:rPr lang="es-MX" dirty="0"/>
+              <a:t>Categoría de Operación	 (OPE): Se realizan las actividades de acuerdo a los elementos </a:t>
+            </a:r>
+            <a:r>
+              <a:rPr lang="es-MX" dirty="0" smtClean="0"/>
+              <a:t>proporcionados</a:t>
+            </a:r>
+            <a:r>
+              <a:rPr lang="es-MX" dirty="0"/>
+              <a:t> </a:t>
+            </a:r>
+            <a:r>
+              <a:rPr lang="es-MX" dirty="0" smtClean="0"/>
+              <a:t>por </a:t>
+            </a:r>
+            <a:r>
+              <a:rPr lang="es-MX" dirty="0"/>
+              <a:t>la Categoría de Gerencia </a:t>
+            </a:r>
+            <a:r>
+              <a:rPr lang="es-MX" dirty="0" smtClean="0"/>
+              <a:t>y entrega</a:t>
+            </a:r>
+            <a:r>
+              <a:rPr lang="es-MX" dirty="0"/>
+              <a:t> </a:t>
+            </a:r>
+            <a:r>
+              <a:rPr lang="es-MX" dirty="0" smtClean="0"/>
+              <a:t>a </a:t>
+            </a:r>
+            <a:r>
+              <a:rPr lang="es-MX" dirty="0"/>
+              <a:t>ésta la información </a:t>
+            </a:r>
+            <a:r>
+              <a:rPr lang="es-MX" dirty="0" smtClean="0"/>
+              <a:t>y productos </a:t>
+            </a:r>
+            <a:r>
+              <a:rPr lang="es-MX" dirty="0"/>
+              <a:t>generados.	</a:t>
+            </a:r>
+            <a:r>
+              <a:rPr lang="es-MX" dirty="0"/>
+              <a:t> </a:t>
+            </a:r>
+            <a:r>
+              <a:rPr lang="es-MX" dirty="0"/>
+              <a:t> </a:t>
+            </a:r>
+          </a:p>
+          <a:p>
+            <a:pPr marL="0" indent="0">
+              <a:buNone/>
+            </a:pPr>
+            <a:r>
+              <a:rPr lang="es-MX" dirty="0"/>
+              <a:t>  	</a:t>
+            </a:r>
+            <a:r>
+              <a:rPr lang="es-MX" dirty="0"/>
+              <a:t> </a:t>
+            </a:r>
+            <a:r>
+              <a:rPr lang="es-MX" dirty="0"/>
+              <a:t> </a:t>
+            </a:r>
+          </a:p>
+          <a:p>
+            <a:endParaRPr lang="es-MX" dirty="0"/>
+          </a:p>
+        </p:txBody>
+      </p:sp>
     </p:spTree>
     <p:extLst>
       <p:ext uri="{BB962C8B-B14F-4D97-AF65-F5344CB8AC3E}">
-        <p14:creationId xmlns:p14="http://schemas.microsoft.com/office/powerpoint/2010/main" val="1759862946"/>
+        <p14:creationId xmlns:p14="http://schemas.microsoft.com/office/powerpoint/2010/main" val="3740252005"/>
       </p:ext>
     </p:extLst>
   </p:cSld>
   <p:clrMapOvr>
     <a:masterClrMapping/>
   </p:clrMapOvr>
+  <p:timing>
+    <p:tnLst>
+      <p:par>
+        <p:cTn id="1" dur="indefinite" restart="never" nodeType="tmRoot"/>
+      </p:par>
+    </p:tnLst>
+  </p:timing>
 </p:sld>
 </file>
 

</xml_diff>